<commit_message>
feat: add new slide
</commit_message>
<xml_diff>
--- a/SSWS- IntelliGlass_presentation.pptx
+++ b/SSWS- IntelliGlass_presentation.pptx
@@ -15,8 +15,9 @@
     <p:sldId id="264" r:id="rId9"/>
     <p:sldId id="266" r:id="rId10"/>
     <p:sldId id="265" r:id="rId11"/>
-    <p:sldId id="267" r:id="rId12"/>
-    <p:sldId id="263" r:id="rId13"/>
+    <p:sldId id="269" r:id="rId12"/>
+    <p:sldId id="267" r:id="rId13"/>
+    <p:sldId id="263" r:id="rId14"/>
   </p:sldIdLst>
   <p:sldSz cx="12192000" cy="6858000"/>
   <p:notesSz cx="6858000" cy="9144000"/>
@@ -637,7 +638,7 @@
           <a:p>
             <a:fld id="{EC3B37F1-08F9-4C97-A342-012E02B015B4}" type="datetimeFigureOut">
               <a:rPr lang="en-US" smtClean="0"/>
-              <a:t>7/22/2025</a:t>
+              <a:t>7/24/2025</a:t>
             </a:fld>
             <a:endParaRPr lang="en-US"/>
           </a:p>
@@ -933,7 +934,7 @@
           <a:p>
             <a:fld id="{EC3B37F1-08F9-4C97-A342-012E02B015B4}" type="datetimeFigureOut">
               <a:rPr lang="en-US" smtClean="0"/>
-              <a:t>7/22/2025</a:t>
+              <a:t>7/24/2025</a:t>
             </a:fld>
             <a:endParaRPr lang="en-US"/>
           </a:p>
@@ -1181,7 +1182,7 @@
           <a:p>
             <a:fld id="{EC3B37F1-08F9-4C97-A342-012E02B015B4}" type="datetimeFigureOut">
               <a:rPr lang="en-US" smtClean="0"/>
-              <a:t>7/22/2025</a:t>
+              <a:t>7/24/2025</a:t>
             </a:fld>
             <a:endParaRPr lang="en-US"/>
           </a:p>
@@ -1721,7 +1722,7 @@
           <a:p>
             <a:fld id="{EC3B37F1-08F9-4C97-A342-012E02B015B4}" type="datetimeFigureOut">
               <a:rPr lang="en-US" smtClean="0"/>
-              <a:t>7/22/2025</a:t>
+              <a:t>7/24/2025</a:t>
             </a:fld>
             <a:endParaRPr lang="en-US"/>
           </a:p>
@@ -1969,7 +1970,7 @@
           <a:p>
             <a:fld id="{EC3B37F1-08F9-4C97-A342-012E02B015B4}" type="datetimeFigureOut">
               <a:rPr lang="en-US" smtClean="0"/>
-              <a:t>7/22/2025</a:t>
+              <a:t>7/24/2025</a:t>
             </a:fld>
             <a:endParaRPr lang="en-US"/>
           </a:p>
@@ -2501,7 +2502,7 @@
           <a:p>
             <a:fld id="{EC3B37F1-08F9-4C97-A342-012E02B015B4}" type="datetimeFigureOut">
               <a:rPr lang="en-US" smtClean="0"/>
-              <a:t>7/22/2025</a:t>
+              <a:t>7/24/2025</a:t>
             </a:fld>
             <a:endParaRPr lang="en-US"/>
           </a:p>
@@ -2798,7 +2799,7 @@
           <a:p>
             <a:fld id="{EC3B37F1-08F9-4C97-A342-012E02B015B4}" type="datetimeFigureOut">
               <a:rPr lang="en-US" smtClean="0"/>
-              <a:t>7/22/2025</a:t>
+              <a:t>7/24/2025</a:t>
             </a:fld>
             <a:endParaRPr lang="en-US"/>
           </a:p>
@@ -2972,7 +2973,7 @@
           <a:p>
             <a:fld id="{EC3B37F1-08F9-4C97-A342-012E02B015B4}" type="datetimeFigureOut">
               <a:rPr lang="en-US" smtClean="0"/>
-              <a:t>7/22/2025</a:t>
+              <a:t>7/24/2025</a:t>
             </a:fld>
             <a:endParaRPr lang="en-US"/>
           </a:p>
@@ -3152,7 +3153,7 @@
           <a:p>
             <a:fld id="{EC3B37F1-08F9-4C97-A342-012E02B015B4}" type="datetimeFigureOut">
               <a:rPr lang="en-US" smtClean="0"/>
-              <a:t>7/22/2025</a:t>
+              <a:t>7/24/2025</a:t>
             </a:fld>
             <a:endParaRPr lang="en-US"/>
           </a:p>
@@ -3322,7 +3323,7 @@
           <a:p>
             <a:fld id="{EC3B37F1-08F9-4C97-A342-012E02B015B4}" type="datetimeFigureOut">
               <a:rPr lang="en-US" smtClean="0"/>
-              <a:t>7/22/2025</a:t>
+              <a:t>7/24/2025</a:t>
             </a:fld>
             <a:endParaRPr lang="en-US"/>
           </a:p>
@@ -3573,7 +3574,7 @@
           <a:p>
             <a:fld id="{EC3B37F1-08F9-4C97-A342-012E02B015B4}" type="datetimeFigureOut">
               <a:rPr lang="en-US" smtClean="0"/>
-              <a:t>7/22/2025</a:t>
+              <a:t>7/24/2025</a:t>
             </a:fld>
             <a:endParaRPr lang="en-US"/>
           </a:p>
@@ -3870,7 +3871,7 @@
           <a:p>
             <a:fld id="{EC3B37F1-08F9-4C97-A342-012E02B015B4}" type="datetimeFigureOut">
               <a:rPr lang="en-US" smtClean="0"/>
-              <a:t>7/22/2025</a:t>
+              <a:t>7/24/2025</a:t>
             </a:fld>
             <a:endParaRPr lang="en-US"/>
           </a:p>
@@ -4312,7 +4313,7 @@
           <a:p>
             <a:fld id="{EC3B37F1-08F9-4C97-A342-012E02B015B4}" type="datetimeFigureOut">
               <a:rPr lang="en-US" smtClean="0"/>
-              <a:t>7/22/2025</a:t>
+              <a:t>7/24/2025</a:t>
             </a:fld>
             <a:endParaRPr lang="en-US"/>
           </a:p>
@@ -4430,7 +4431,7 @@
           <a:p>
             <a:fld id="{EC3B37F1-08F9-4C97-A342-012E02B015B4}" type="datetimeFigureOut">
               <a:rPr lang="en-US" smtClean="0"/>
-              <a:t>7/22/2025</a:t>
+              <a:t>7/24/2025</a:t>
             </a:fld>
             <a:endParaRPr lang="en-US"/>
           </a:p>
@@ -4525,7 +4526,7 @@
           <a:p>
             <a:fld id="{EC3B37F1-08F9-4C97-A342-012E02B015B4}" type="datetimeFigureOut">
               <a:rPr lang="en-US" smtClean="0"/>
-              <a:t>7/22/2025</a:t>
+              <a:t>7/24/2025</a:t>
             </a:fld>
             <a:endParaRPr lang="en-US"/>
           </a:p>
@@ -4808,7 +4809,7 @@
           <a:p>
             <a:fld id="{EC3B37F1-08F9-4C97-A342-012E02B015B4}" type="datetimeFigureOut">
               <a:rPr lang="en-US" smtClean="0"/>
-              <a:t>7/22/2025</a:t>
+              <a:t>7/24/2025</a:t>
             </a:fld>
             <a:endParaRPr lang="en-US"/>
           </a:p>
@@ -5099,7 +5100,7 @@
           <a:p>
             <a:fld id="{EC3B37F1-08F9-4C97-A342-012E02B015B4}" type="datetimeFigureOut">
               <a:rPr lang="en-US" smtClean="0"/>
-              <a:t>7/22/2025</a:t>
+              <a:t>7/24/2025</a:t>
             </a:fld>
             <a:endParaRPr lang="en-US"/>
           </a:p>
@@ -5629,7 +5630,7 @@
           <a:p>
             <a:fld id="{EC3B37F1-08F9-4C97-A342-012E02B015B4}" type="datetimeFigureOut">
               <a:rPr lang="en-US" smtClean="0"/>
-              <a:t>7/22/2025</a:t>
+              <a:t>7/24/2025</a:t>
             </a:fld>
             <a:endParaRPr lang="en-US"/>
           </a:p>
@@ -6752,6 +6753,608 @@
         <p:cNvPr id="1" name="">
           <a:extLst>
             <a:ext uri="{FF2B5EF4-FFF2-40B4-BE49-F238E27FC236}">
+              <a16:creationId xmlns:a16="http://schemas.microsoft.com/office/drawing/2014/main" id="{B48C4FC3-BE5B-43C6-D135-CACBE2D48FDD}"/>
+            </a:ext>
+          </a:extLst>
+        </p:cNvPr>
+        <p:cNvGrpSpPr/>
+        <p:nvPr/>
+      </p:nvGrpSpPr>
+      <p:grpSpPr>
+        <a:xfrm>
+          <a:off x="0" y="0"/>
+          <a:ext cx="0" cy="0"/>
+          <a:chOff x="0" y="0"/>
+          <a:chExt cx="0" cy="0"/>
+        </a:xfrm>
+      </p:grpSpPr>
+      <p:sp>
+        <p:nvSpPr>
+          <p:cNvPr id="3" name="Title 1">
+            <a:extLst>
+              <a:ext uri="{FF2B5EF4-FFF2-40B4-BE49-F238E27FC236}">
+                <a16:creationId xmlns:a16="http://schemas.microsoft.com/office/drawing/2014/main" id="{58A34B05-B990-E289-91E3-1B971DB7EF21}"/>
+              </a:ext>
+            </a:extLst>
+          </p:cNvPr>
+          <p:cNvSpPr txBox="1">
+            <a:spLocks/>
+          </p:cNvSpPr>
+          <p:nvPr/>
+        </p:nvSpPr>
+        <p:spPr>
+          <a:xfrm>
+            <a:off x="1084728" y="0"/>
+            <a:ext cx="9386049" cy="1113437"/>
+          </a:xfrm>
+          <a:prstGeom prst="rect">
+            <a:avLst/>
+          </a:prstGeom>
+          <a:effectLst/>
+        </p:spPr>
+        <p:txBody>
+          <a:bodyPr vert="horz" lIns="91440" tIns="45720" rIns="91440" bIns="45720" rtlCol="0" anchor="ctr">
+            <a:noAutofit/>
+          </a:bodyPr>
+          <a:lstStyle>
+            <a:lvl1pPr algn="ctr" defTabSz="457200" rtl="0" eaLnBrk="1" latinLnBrk="0" hangingPunct="1">
+              <a:spcBef>
+                <a:spcPct val="0"/>
+              </a:spcBef>
+              <a:buNone/>
+              <a:defRPr sz="4000" kern="1200" cap="none">
+                <a:ln w="3175" cmpd="sng">
+                  <a:noFill/>
+                </a:ln>
+                <a:solidFill>
+                  <a:schemeClr val="tx1"/>
+                </a:solidFill>
+                <a:effectLst/>
+                <a:latin typeface="+mj-lt"/>
+                <a:ea typeface="+mj-ea"/>
+                <a:cs typeface="+mj-cs"/>
+              </a:defRPr>
+            </a:lvl1pPr>
+            <a:lvl2pPr eaLnBrk="1" hangingPunct="1">
+              <a:defRPr>
+                <a:solidFill>
+                  <a:schemeClr val="tx2"/>
+                </a:solidFill>
+              </a:defRPr>
+            </a:lvl2pPr>
+            <a:lvl3pPr eaLnBrk="1" hangingPunct="1">
+              <a:defRPr>
+                <a:solidFill>
+                  <a:schemeClr val="tx2"/>
+                </a:solidFill>
+              </a:defRPr>
+            </a:lvl3pPr>
+            <a:lvl4pPr eaLnBrk="1" hangingPunct="1">
+              <a:defRPr>
+                <a:solidFill>
+                  <a:schemeClr val="tx2"/>
+                </a:solidFill>
+              </a:defRPr>
+            </a:lvl4pPr>
+            <a:lvl5pPr eaLnBrk="1" hangingPunct="1">
+              <a:defRPr>
+                <a:solidFill>
+                  <a:schemeClr val="tx2"/>
+                </a:solidFill>
+              </a:defRPr>
+            </a:lvl5pPr>
+            <a:lvl6pPr eaLnBrk="1" hangingPunct="1">
+              <a:defRPr>
+                <a:solidFill>
+                  <a:schemeClr val="tx2"/>
+                </a:solidFill>
+              </a:defRPr>
+            </a:lvl6pPr>
+            <a:lvl7pPr eaLnBrk="1" hangingPunct="1">
+              <a:defRPr>
+                <a:solidFill>
+                  <a:schemeClr val="tx2"/>
+                </a:solidFill>
+              </a:defRPr>
+            </a:lvl7pPr>
+            <a:lvl8pPr eaLnBrk="1" hangingPunct="1">
+              <a:defRPr>
+                <a:solidFill>
+                  <a:schemeClr val="tx2"/>
+                </a:solidFill>
+              </a:defRPr>
+            </a:lvl8pPr>
+            <a:lvl9pPr eaLnBrk="1" hangingPunct="1">
+              <a:defRPr>
+                <a:solidFill>
+                  <a:schemeClr val="tx2"/>
+                </a:solidFill>
+              </a:defRPr>
+            </a:lvl9pPr>
+          </a:lstStyle>
+          <a:p>
+            <a:pPr marL="457200" indent="-457200">
+              <a:buFont typeface="Wingdings" panose="05000000000000000000" pitchFamily="2" charset="2"/>
+              <a:buChar char="v"/>
+            </a:pPr>
+            <a:r>
+              <a:rPr lang="en-US" sz="2800" b="1" dirty="0"/>
+              <a:t>Distributed System Architecture for </a:t>
+            </a:r>
+            <a:r>
+              <a:rPr lang="en-US" sz="2800" b="1" dirty="0" err="1"/>
+              <a:t>IntelliGlass</a:t>
+            </a:r>
+            <a:r>
+              <a:rPr lang="en-US" sz="2800" b="1" dirty="0"/>
+              <a:t> Grid</a:t>
+            </a:r>
+            <a:br>
+              <a:rPr lang="en-US" sz="2800" b="1" dirty="0">
+                <a:solidFill>
+                  <a:schemeClr val="accent1"/>
+                </a:solidFill>
+              </a:rPr>
+            </a:br>
+            <a:endParaRPr lang="en-US" sz="2800" b="1" dirty="0">
+              <a:solidFill>
+                <a:schemeClr val="tx2"/>
+              </a:solidFill>
+            </a:endParaRPr>
+          </a:p>
+        </p:txBody>
+      </p:sp>
+      <p:sp>
+        <p:nvSpPr>
+          <p:cNvPr id="5" name="TextBox 4">
+            <a:extLst>
+              <a:ext uri="{FF2B5EF4-FFF2-40B4-BE49-F238E27FC236}">
+                <a16:creationId xmlns:a16="http://schemas.microsoft.com/office/drawing/2014/main" id="{3347E18F-BBC2-F06B-FE57-685320D74251}"/>
+              </a:ext>
+            </a:extLst>
+          </p:cNvPr>
+          <p:cNvSpPr txBox="1"/>
+          <p:nvPr/>
+        </p:nvSpPr>
+        <p:spPr>
+          <a:xfrm>
+            <a:off x="4798372" y="6307448"/>
+            <a:ext cx="3989293" cy="275588"/>
+          </a:xfrm>
+          <a:prstGeom prst="rect">
+            <a:avLst/>
+          </a:prstGeom>
+          <a:noFill/>
+        </p:spPr>
+        <p:txBody>
+          <a:bodyPr wrap="square">
+            <a:spAutoFit/>
+          </a:bodyPr>
+          <a:lstStyle/>
+          <a:p>
+            <a:pPr algn="ctr">
+              <a:lnSpc>
+                <a:spcPct val="115000"/>
+              </a:lnSpc>
+              <a:spcAft>
+                <a:spcPts val="800"/>
+              </a:spcAft>
+            </a:pPr>
+            <a:r>
+              <a:rPr lang="en-US" sz="1100" kern="100" dirty="0">
+                <a:latin typeface="+mj-lt"/>
+                <a:ea typeface="Times New Roman" panose="02020603050405020304" pitchFamily="18" charset="0"/>
+                <a:cs typeface="Arial" panose="020B0604020202020204" pitchFamily="34" charset="0"/>
+              </a:rPr>
+              <a:t>Fig . Alignment of the Panel Position with the Sun’s Movement</a:t>
+            </a:r>
+            <a:endParaRPr lang="en-US" sz="1100" kern="100" dirty="0">
+              <a:effectLst/>
+              <a:latin typeface="+mj-lt"/>
+              <a:ea typeface="Times New Roman" panose="02020603050405020304" pitchFamily="18" charset="0"/>
+              <a:cs typeface="Arial" panose="020B0604020202020204" pitchFamily="34" charset="0"/>
+            </a:endParaRPr>
+          </a:p>
+        </p:txBody>
+      </p:sp>
+      <p:sp>
+        <p:nvSpPr>
+          <p:cNvPr id="6" name="Rectangle 2">
+            <a:extLst>
+              <a:ext uri="{FF2B5EF4-FFF2-40B4-BE49-F238E27FC236}">
+                <a16:creationId xmlns:a16="http://schemas.microsoft.com/office/drawing/2014/main" id="{F4EACDC2-9425-7AFA-E018-EFD43A539904}"/>
+              </a:ext>
+            </a:extLst>
+          </p:cNvPr>
+          <p:cNvSpPr>
+            <a:spLocks noChangeArrowheads="1"/>
+          </p:cNvSpPr>
+          <p:nvPr/>
+        </p:nvSpPr>
+        <p:spPr bwMode="auto">
+          <a:xfrm>
+            <a:off x="1247741" y="1550895"/>
+            <a:ext cx="6665946" cy="2862322"/>
+          </a:xfrm>
+          <a:prstGeom prst="rect">
+            <a:avLst/>
+          </a:prstGeom>
+          <a:noFill/>
+          <a:ln>
+            <a:noFill/>
+          </a:ln>
+          <a:effectLst/>
+          <a:extLst>
+            <a:ext uri="{909E8E84-426E-40DD-AFC4-6F175D3DCCD1}">
+              <a14:hiddenFill xmlns:a14="http://schemas.microsoft.com/office/drawing/2010/main">
+                <a:solidFill>
+                  <a:schemeClr val="accent1"/>
+                </a:solidFill>
+              </a14:hiddenFill>
+            </a:ext>
+            <a:ext uri="{91240B29-F687-4F45-9708-019B960494DF}">
+              <a14:hiddenLine xmlns:a14="http://schemas.microsoft.com/office/drawing/2010/main" w="9525">
+                <a:solidFill>
+                  <a:schemeClr val="tx1"/>
+                </a:solidFill>
+                <a:miter lim="800000"/>
+                <a:headEnd/>
+                <a:tailEnd/>
+              </a14:hiddenLine>
+            </a:ext>
+            <a:ext uri="{AF507438-7753-43E0-B8FC-AC1667EBCBE1}">
+              <a14:hiddenEffects xmlns:a14="http://schemas.microsoft.com/office/drawing/2010/main">
+                <a:effectLst>
+                  <a:outerShdw dist="35921" dir="2700000" algn="ctr" rotWithShape="0">
+                    <a:schemeClr val="bg2"/>
+                  </a:outerShdw>
+                </a:effectLst>
+              </a14:hiddenEffects>
+            </a:ext>
+          </a:extLst>
+        </p:spPr>
+        <p:txBody>
+          <a:bodyPr vert="horz" wrap="square" lIns="91440" tIns="45720" rIns="91440" bIns="45720" numCol="1" anchor="ctr" anchorCtr="0" compatLnSpc="1">
+            <a:prstTxWarp prst="textNoShape">
+              <a:avLst/>
+            </a:prstTxWarp>
+            <a:spAutoFit/>
+          </a:bodyPr>
+          <a:lstStyle/>
+          <a:p>
+            <a:pPr marL="285750" marR="0" lvl="0" indent="-285750" algn="l" defTabSz="914400" rtl="0" eaLnBrk="0" fontAlgn="base" latinLnBrk="0" hangingPunct="0">
+              <a:lnSpc>
+                <a:spcPct val="100000"/>
+              </a:lnSpc>
+              <a:spcBef>
+                <a:spcPct val="0"/>
+              </a:spcBef>
+              <a:spcAft>
+                <a:spcPct val="0"/>
+              </a:spcAft>
+              <a:buClrTx/>
+              <a:buSzTx/>
+              <a:buFont typeface="Wingdings" panose="05000000000000000000" pitchFamily="2" charset="2"/>
+              <a:buChar char="v"/>
+              <a:tabLst/>
+            </a:pPr>
+            <a:r>
+              <a:rPr kumimoji="0" lang="en-US" altLang="en-US" sz="1800" b="0" i="0" u="none" strike="noStrike" cap="none" normalizeH="0" baseline="0" dirty="0">
+                <a:ln>
+                  <a:noFill/>
+                </a:ln>
+                <a:effectLst/>
+              </a:rPr>
+              <a:t>Each</a:t>
+            </a:r>
+            <a:r>
+              <a:rPr kumimoji="0" lang="en-US" altLang="en-US" sz="1800" b="0" i="0" u="none" strike="noStrike" cap="none" normalizeH="0" baseline="0" dirty="0">
+                <a:ln>
+                  <a:noFill/>
+                </a:ln>
+                <a:solidFill>
+                  <a:schemeClr val="tx1"/>
+                </a:solidFill>
+                <a:effectLst/>
+              </a:rPr>
+              <a:t> smart window is a standalone unit with </a:t>
+            </a:r>
+            <a:r>
+              <a:rPr kumimoji="0" lang="en-US" altLang="en-US" sz="1800" b="1" i="0" u="none" strike="noStrike" cap="none" normalizeH="0" baseline="0" dirty="0">
+                <a:ln>
+                  <a:noFill/>
+                </a:ln>
+                <a:solidFill>
+                  <a:schemeClr val="accent1"/>
+                </a:solidFill>
+                <a:effectLst/>
+              </a:rPr>
+              <a:t>an ESP32 microcontroller.</a:t>
+            </a:r>
+          </a:p>
+          <a:p>
+            <a:pPr marL="285750" lvl="0" indent="-285750" defTabSz="914400" eaLnBrk="0" fontAlgn="base" hangingPunct="0">
+              <a:spcBef>
+                <a:spcPct val="0"/>
+              </a:spcBef>
+              <a:spcAft>
+                <a:spcPct val="0"/>
+              </a:spcAft>
+              <a:buFont typeface="Wingdings" panose="05000000000000000000" pitchFamily="2" charset="2"/>
+              <a:buChar char="v"/>
+            </a:pPr>
+            <a:r>
+              <a:rPr lang="en-US" altLang="en-US" dirty="0">
+                <a:solidFill>
+                  <a:schemeClr val="accent1"/>
+                </a:solidFill>
+              </a:rPr>
+              <a:t> The microcontroller directly manages sensors (light, smoke, rain) and actuators</a:t>
+            </a:r>
+            <a:r>
+              <a:rPr kumimoji="0" lang="en-US" altLang="en-US" sz="1800" b="0" i="0" u="none" strike="noStrike" cap="none" normalizeH="0" baseline="0" dirty="0">
+                <a:ln>
+                  <a:noFill/>
+                </a:ln>
+                <a:solidFill>
+                  <a:schemeClr val="tx1"/>
+                </a:solidFill>
+                <a:effectLst/>
+              </a:rPr>
+              <a:t>.</a:t>
+            </a:r>
+          </a:p>
+          <a:p>
+            <a:pPr marL="285750" marR="0" lvl="0" indent="-285750" algn="l" defTabSz="914400" rtl="0" eaLnBrk="0" fontAlgn="base" latinLnBrk="0" hangingPunct="0">
+              <a:lnSpc>
+                <a:spcPct val="100000"/>
+              </a:lnSpc>
+              <a:spcBef>
+                <a:spcPct val="0"/>
+              </a:spcBef>
+              <a:spcAft>
+                <a:spcPct val="0"/>
+              </a:spcAft>
+              <a:buClrTx/>
+              <a:buSzTx/>
+              <a:buFont typeface="Wingdings" panose="05000000000000000000" pitchFamily="2" charset="2"/>
+              <a:buChar char="v"/>
+              <a:tabLst/>
+            </a:pPr>
+            <a:r>
+              <a:rPr kumimoji="0" lang="en-US" altLang="en-US" sz="1800" b="0" i="0" u="none" strike="noStrike" cap="none" normalizeH="0" baseline="0" dirty="0">
+                <a:ln>
+                  <a:noFill/>
+                </a:ln>
+                <a:solidFill>
+                  <a:schemeClr val="tx1"/>
+                </a:solidFill>
+                <a:effectLst/>
+              </a:rPr>
+              <a:t>All units communicate wirelessly using the </a:t>
+            </a:r>
+            <a:r>
+              <a:rPr kumimoji="0" lang="en-US" altLang="en-US" sz="1800" b="1" i="0" u="none" strike="noStrike" cap="none" normalizeH="0" baseline="0" dirty="0">
+                <a:ln>
+                  <a:noFill/>
+                </a:ln>
+                <a:solidFill>
+                  <a:schemeClr val="accent1"/>
+                </a:solidFill>
+                <a:effectLst/>
+              </a:rPr>
+              <a:t>MQTT protocol</a:t>
+            </a:r>
+            <a:r>
+              <a:rPr kumimoji="0" lang="en-US" altLang="en-US" sz="1800" b="0" i="0" u="none" strike="noStrike" cap="none" normalizeH="0" baseline="0" dirty="0">
+                <a:ln>
+                  <a:noFill/>
+                </a:ln>
+                <a:solidFill>
+                  <a:schemeClr val="tx1"/>
+                </a:solidFill>
+                <a:effectLst/>
+              </a:rPr>
+              <a:t>.</a:t>
+            </a:r>
+          </a:p>
+          <a:p>
+            <a:pPr marL="285750" marR="0" lvl="0" indent="-285750" algn="l" defTabSz="914400" rtl="0" eaLnBrk="0" fontAlgn="base" latinLnBrk="0" hangingPunct="0">
+              <a:lnSpc>
+                <a:spcPct val="100000"/>
+              </a:lnSpc>
+              <a:spcBef>
+                <a:spcPct val="0"/>
+              </a:spcBef>
+              <a:spcAft>
+                <a:spcPct val="0"/>
+              </a:spcAft>
+              <a:buClrTx/>
+              <a:buSzTx/>
+              <a:buFont typeface="Wingdings" panose="05000000000000000000" pitchFamily="2" charset="2"/>
+              <a:buChar char="v"/>
+              <a:tabLst/>
+            </a:pPr>
+            <a:r>
+              <a:rPr kumimoji="0" lang="en-US" altLang="en-US" sz="1800" b="0" i="0" u="none" strike="noStrike" cap="none" normalizeH="0" baseline="0" dirty="0">
+                <a:ln>
+                  <a:noFill/>
+                </a:ln>
+                <a:solidFill>
+                  <a:schemeClr val="tx1"/>
+                </a:solidFill>
+                <a:effectLst/>
+              </a:rPr>
+              <a:t>A central </a:t>
+            </a:r>
+            <a:r>
+              <a:rPr kumimoji="0" lang="en-US" altLang="en-US" sz="1800" b="1" i="0" u="none" strike="noStrike" cap="none" normalizeH="0" baseline="0" dirty="0">
+                <a:ln>
+                  <a:noFill/>
+                </a:ln>
+                <a:solidFill>
+                  <a:schemeClr val="accent1"/>
+                </a:solidFill>
+                <a:effectLst/>
+              </a:rPr>
+              <a:t>MQTT broker </a:t>
+            </a:r>
+            <a:r>
+              <a:rPr kumimoji="0" lang="en-US" altLang="en-US" sz="1800" b="0" i="0" u="none" strike="noStrike" cap="none" normalizeH="0" baseline="0" dirty="0">
+                <a:ln>
+                  <a:noFill/>
+                </a:ln>
+                <a:solidFill>
+                  <a:schemeClr val="tx1"/>
+                </a:solidFill>
+                <a:effectLst/>
+              </a:rPr>
+              <a:t>collects data and distributes commands.</a:t>
+            </a:r>
+          </a:p>
+          <a:p>
+            <a:pPr marL="285750" marR="0" lvl="0" indent="-285750" algn="l" defTabSz="914400" rtl="0" eaLnBrk="0" fontAlgn="base" latinLnBrk="0" hangingPunct="0">
+              <a:lnSpc>
+                <a:spcPct val="100000"/>
+              </a:lnSpc>
+              <a:spcBef>
+                <a:spcPct val="0"/>
+              </a:spcBef>
+              <a:spcAft>
+                <a:spcPct val="0"/>
+              </a:spcAft>
+              <a:buClrTx/>
+              <a:buSzTx/>
+              <a:buFont typeface="Wingdings" panose="05000000000000000000" pitchFamily="2" charset="2"/>
+              <a:buChar char="v"/>
+              <a:tabLst/>
+            </a:pPr>
+            <a:r>
+              <a:rPr kumimoji="0" lang="en-US" altLang="en-US" sz="1800" b="0" i="0" u="none" strike="noStrike" cap="none" normalizeH="0" baseline="0" dirty="0">
+                <a:ln>
+                  <a:noFill/>
+                </a:ln>
+                <a:solidFill>
+                  <a:schemeClr val="tx1"/>
+                </a:solidFill>
+                <a:effectLst/>
+              </a:rPr>
+              <a:t>Integration with platforms like Firebase or Blynk enables cloud control, data logging, and visualization.</a:t>
+            </a:r>
+          </a:p>
+          <a:p>
+            <a:pPr marL="285750" marR="0" lvl="0" indent="-285750" algn="l" defTabSz="914400" rtl="0" eaLnBrk="0" fontAlgn="base" latinLnBrk="0" hangingPunct="0">
+              <a:lnSpc>
+                <a:spcPct val="100000"/>
+              </a:lnSpc>
+              <a:spcBef>
+                <a:spcPct val="0"/>
+              </a:spcBef>
+              <a:spcAft>
+                <a:spcPct val="0"/>
+              </a:spcAft>
+              <a:buClrTx/>
+              <a:buSzTx/>
+              <a:buFont typeface="Wingdings" panose="05000000000000000000" pitchFamily="2" charset="2"/>
+              <a:buChar char="v"/>
+              <a:tabLst/>
+            </a:pPr>
+            <a:r>
+              <a:rPr kumimoji="0" lang="en-US" altLang="en-US" sz="1800" b="0" i="0" u="none" strike="noStrike" cap="none" normalizeH="0" baseline="0" dirty="0">
+                <a:ln>
+                  <a:noFill/>
+                </a:ln>
+                <a:solidFill>
+                  <a:schemeClr val="tx1"/>
+                </a:solidFill>
+                <a:effectLst/>
+              </a:rPr>
+              <a:t>The system supports real-time monitoring, manual override, automated scheduling, and more features.</a:t>
+            </a:r>
+          </a:p>
+        </p:txBody>
+      </p:sp>
+      <p:pic>
+        <p:nvPicPr>
+          <p:cNvPr id="1027" name="Picture 3">
+            <a:extLst>
+              <a:ext uri="{FF2B5EF4-FFF2-40B4-BE49-F238E27FC236}">
+                <a16:creationId xmlns:a16="http://schemas.microsoft.com/office/drawing/2014/main" id="{03FB676C-F55D-A370-FD84-E275D5A5C368}"/>
+              </a:ext>
+            </a:extLst>
+          </p:cNvPr>
+          <p:cNvPicPr>
+            <a:picLocks noChangeAspect="1" noChangeArrowheads="1"/>
+          </p:cNvPicPr>
+          <p:nvPr/>
+        </p:nvPicPr>
+        <p:blipFill>
+          <a:blip r:embed="rId2">
+            <a:extLst>
+              <a:ext uri="{28A0092B-C50C-407E-A947-70E740481C1C}">
+                <a14:useLocalDpi xmlns:a14="http://schemas.microsoft.com/office/drawing/2010/main" val="0"/>
+              </a:ext>
+            </a:extLst>
+          </a:blip>
+          <a:srcRect/>
+          <a:stretch>
+            <a:fillRect/>
+          </a:stretch>
+        </p:blipFill>
+        <p:spPr bwMode="auto">
+          <a:xfrm>
+            <a:off x="7913687" y="922054"/>
+            <a:ext cx="4278313" cy="4385051"/>
+          </a:xfrm>
+          <a:prstGeom prst="rect">
+            <a:avLst/>
+          </a:prstGeom>
+          <a:noFill/>
+          <a:ln>
+            <a:noFill/>
+          </a:ln>
+          <a:extLst>
+            <a:ext uri="{909E8E84-426E-40DD-AFC4-6F175D3DCCD1}">
+              <a14:hiddenFill xmlns:a14="http://schemas.microsoft.com/office/drawing/2010/main">
+                <a:solidFill>
+                  <a:srgbClr val="FFFFFF"/>
+                </a:solidFill>
+              </a14:hiddenFill>
+            </a:ext>
+            <a:ext uri="{91240B29-F687-4F45-9708-019B960494DF}">
+              <a14:hiddenLine xmlns:a14="http://schemas.microsoft.com/office/drawing/2010/main" w="9525">
+                <a:solidFill>
+                  <a:srgbClr val="000000"/>
+                </a:solidFill>
+                <a:miter lim="800000"/>
+                <a:headEnd/>
+                <a:tailEnd/>
+              </a14:hiddenLine>
+            </a:ext>
+          </a:extLst>
+        </p:spPr>
+      </p:pic>
+    </p:spTree>
+    <p:extLst>
+      <p:ext uri="{BB962C8B-B14F-4D97-AF65-F5344CB8AC3E}">
+        <p14:creationId xmlns:p14="http://schemas.microsoft.com/office/powerpoint/2010/main" val="2912065702"/>
+      </p:ext>
+    </p:extLst>
+  </p:cSld>
+  <p:clrMapOvr>
+    <a:masterClrMapping/>
+  </p:clrMapOvr>
+</p:sld>
+</file>
+
+<file path=ppt/slides/slide12.xml><?xml version="1.0" encoding="utf-8"?>
+<p:sld xmlns:a="http://schemas.openxmlformats.org/drawingml/2006/main" xmlns:r="http://schemas.openxmlformats.org/officeDocument/2006/relationships" xmlns:p="http://schemas.openxmlformats.org/presentationml/2006/main">
+  <p:cSld>
+    <p:spTree>
+      <p:nvGrpSpPr>
+        <p:cNvPr id="1" name="">
+          <a:extLst>
+            <a:ext uri="{FF2B5EF4-FFF2-40B4-BE49-F238E27FC236}">
               <a16:creationId xmlns:a16="http://schemas.microsoft.com/office/drawing/2014/main" id="{E92FA58A-85E0-6827-4DB2-9034467B7120}"/>
             </a:ext>
           </a:extLst>
@@ -7821,7 +8424,7 @@
 </p:sld>
 </file>
 
-<file path=ppt/slides/slide12.xml><?xml version="1.0" encoding="utf-8"?>
+<file path=ppt/slides/slide13.xml><?xml version="1.0" encoding="utf-8"?>
 <p:sld xmlns:a="http://schemas.openxmlformats.org/drawingml/2006/main" xmlns:r="http://schemas.openxmlformats.org/officeDocument/2006/relationships" xmlns:p="http://schemas.openxmlformats.org/presentationml/2006/main">
   <p:cSld>
     <p:spTree>
@@ -8089,7 +8692,7 @@
         <p:spPr>
           <a:xfrm>
             <a:off x="1996256" y="3279392"/>
-            <a:ext cx="8894905" cy="2862322"/>
+            <a:ext cx="8894905" cy="3416320"/>
           </a:xfrm>
           <a:prstGeom prst="rect">
             <a:avLst/>
@@ -8229,6 +8832,28 @@
             <a:r>
               <a:rPr lang="en-US" dirty="0"/>
               <a:t>Describes the solar tracking methodology, system simulations using Simulink, and PID controller design</a:t>
+            </a:r>
+          </a:p>
+          <a:p>
+            <a:pPr marL="285750" indent="-285750">
+              <a:buFont typeface="Wingdings" panose="05000000000000000000" pitchFamily="2" charset="2"/>
+              <a:buChar char="q"/>
+            </a:pPr>
+            <a:r>
+              <a:rPr lang="en-US" b="1" dirty="0">
+                <a:solidFill>
+                  <a:schemeClr val="accent1"/>
+                </a:solidFill>
+              </a:rPr>
+              <a:t>Distributed System Architecture: </a:t>
+            </a:r>
+            <a:r>
+              <a:rPr lang="en-US" dirty="0">
+                <a:solidFill>
+                  <a:schemeClr val="tx2"/>
+                </a:solidFill>
+              </a:rPr>
+              <a:t>Describe the evolution of the system to be a distributed control system.</a:t>
             </a:r>
           </a:p>
           <a:p>

</xml_diff>